<commit_message>
Updated slides and docker files
</commit_message>
<xml_diff>
--- a/slides/triads-ris-workshop-day-3.pptx
+++ b/slides/triads-ris-workshop-day-3.pptx
@@ -5,7 +5,7 @@
     <p:sldMasterId id="2147483648" r:id="rId1"/>
   </p:sldMasterIdLst>
   <p:notesMasterIdLst>
-    <p:notesMasterId r:id="rId18"/>
+    <p:notesMasterId r:id="rId21"/>
   </p:notesMasterIdLst>
   <p:sldIdLst>
     <p:sldId id="256" r:id="rId2"/>
@@ -22,8 +22,11 @@
     <p:sldId id="324" r:id="rId13"/>
     <p:sldId id="319" r:id="rId14"/>
     <p:sldId id="322" r:id="rId15"/>
-    <p:sldId id="297" r:id="rId16"/>
-    <p:sldId id="294" r:id="rId17"/>
+    <p:sldId id="326" r:id="rId16"/>
+    <p:sldId id="325" r:id="rId17"/>
+    <p:sldId id="327" r:id="rId18"/>
+    <p:sldId id="297" r:id="rId19"/>
+    <p:sldId id="294" r:id="rId20"/>
   </p:sldIdLst>
   <p:sldSz cx="12192000" cy="6858000"/>
   <p:notesSz cx="6858000" cy="9144000"/>
@@ -628,7 +631,7 @@
           <a:p>
             <a:fld id="{C2FD1589-7E77-6440-8706-C35CABE01F1C}" type="slidenum">
               <a:rPr lang="en-US" smtClean="0"/>
-              <a:t>16</a:t>
+              <a:t>19</a:t>
             </a:fld>
             <a:endParaRPr lang="en-US"/>
           </a:p>
@@ -5409,15 +5412,36 @@
             <a:pPr lvl="1"/>
             <a:r>
               <a:rPr lang="en-US" dirty="0"/>
-              <a:t>ADD . .</a:t>
+              <a:t>COPY * .</a:t>
             </a:r>
           </a:p>
           <a:p>
             <a:pPr lvl="1"/>
             <a:r>
               <a:rPr lang="en-US" dirty="0"/>
-              <a:t>Let’s try an example of that</a:t>
-            </a:r>
+              <a:t>ADD https://</a:t>
+            </a:r>
+            <a:r>
+              <a:rPr lang="en-US" dirty="0" err="1"/>
+              <a:t>github.com</a:t>
+            </a:r>
+            <a:r>
+              <a:rPr lang="en-US" dirty="0"/>
+              <a:t>/</a:t>
+            </a:r>
+            <a:r>
+              <a:rPr lang="en-US" dirty="0" err="1"/>
+              <a:t>GregePorter</a:t>
+            </a:r>
+            <a:r>
+              <a:rPr lang="en-US" dirty="0"/>
+              <a:t>/RIS-</a:t>
+            </a:r>
+            <a:r>
+              <a:rPr lang="en-US" dirty="0" err="1"/>
+              <a:t>quickstart.git</a:t>
+            </a:r>
+            <a:endParaRPr lang="en-US" dirty="0"/>
           </a:p>
         </p:txBody>
       </p:sp>
@@ -5456,6 +5480,331 @@
           <p:cNvPr id="2" name="Title 1">
             <a:extLst>
               <a:ext uri="{FF2B5EF4-FFF2-40B4-BE49-F238E27FC236}">
+                <a16:creationId xmlns:a16="http://schemas.microsoft.com/office/drawing/2014/main" id="{78EE93E2-F570-B08D-5DEE-3395A3715372}"/>
+              </a:ext>
+            </a:extLst>
+          </p:cNvPr>
+          <p:cNvSpPr>
+            <a:spLocks noGrp="1"/>
+          </p:cNvSpPr>
+          <p:nvPr>
+            <p:ph type="title"/>
+          </p:nvPr>
+        </p:nvSpPr>
+        <p:spPr/>
+        <p:txBody>
+          <a:bodyPr/>
+          <a:lstStyle/>
+          <a:p>
+            <a:r>
+              <a:rPr lang="en-US" dirty="0"/>
+              <a:t>More details about the </a:t>
+            </a:r>
+            <a:r>
+              <a:rPr lang="en-US" dirty="0" err="1"/>
+              <a:t>Dockerfile</a:t>
+            </a:r>
+            <a:endParaRPr lang="en-US" dirty="0"/>
+          </a:p>
+        </p:txBody>
+      </p:sp>
+      <p:sp>
+        <p:nvSpPr>
+          <p:cNvPr id="3" name="Content Placeholder 2">
+            <a:extLst>
+              <a:ext uri="{FF2B5EF4-FFF2-40B4-BE49-F238E27FC236}">
+                <a16:creationId xmlns:a16="http://schemas.microsoft.com/office/drawing/2014/main" id="{C27CE259-C285-F5E9-8844-A383B2563925}"/>
+              </a:ext>
+            </a:extLst>
+          </p:cNvPr>
+          <p:cNvSpPr>
+            <a:spLocks noGrp="1"/>
+          </p:cNvSpPr>
+          <p:nvPr>
+            <p:ph idx="1"/>
+          </p:nvPr>
+        </p:nvSpPr>
+        <p:spPr/>
+        <p:txBody>
+          <a:bodyPr/>
+          <a:lstStyle/>
+          <a:p>
+            <a:r>
+              <a:rPr lang="en-US" dirty="0"/>
+              <a:t>COPY --</a:t>
+            </a:r>
+            <a:r>
+              <a:rPr lang="en-US" dirty="0" err="1"/>
+              <a:t>chmod</a:t>
+            </a:r>
+            <a:r>
+              <a:rPr lang="en-US" dirty="0"/>
+              <a:t>=775 * .</a:t>
+            </a:r>
+          </a:p>
+          <a:p>
+            <a:endParaRPr lang="en-US" dirty="0"/>
+          </a:p>
+          <a:p>
+            <a:r>
+              <a:rPr lang="en-US" dirty="0"/>
+              <a:t>This will copy the contents of the current directory into the root of the container (with the correct permissions)</a:t>
+            </a:r>
+          </a:p>
+        </p:txBody>
+      </p:sp>
+    </p:spTree>
+    <p:extLst>
+      <p:ext uri="{BB962C8B-B14F-4D97-AF65-F5344CB8AC3E}">
+        <p14:creationId xmlns:p14="http://schemas.microsoft.com/office/powerpoint/2010/main" val="381291873"/>
+      </p:ext>
+    </p:extLst>
+  </p:cSld>
+  <p:clrMapOvr>
+    <a:masterClrMapping/>
+  </p:clrMapOvr>
+</p:sld>
+</file>
+
+<file path=ppt/slides/slide16.xml><?xml version="1.0" encoding="utf-8"?>
+<p:sld xmlns:a="http://schemas.openxmlformats.org/drawingml/2006/main" xmlns:r="http://schemas.openxmlformats.org/officeDocument/2006/relationships" xmlns:p="http://schemas.openxmlformats.org/presentationml/2006/main">
+  <p:cSld>
+    <p:spTree>
+      <p:nvGrpSpPr>
+        <p:cNvPr id="1" name=""/>
+        <p:cNvGrpSpPr/>
+        <p:nvPr/>
+      </p:nvGrpSpPr>
+      <p:grpSpPr>
+        <a:xfrm>
+          <a:off x="0" y="0"/>
+          <a:ext cx="0" cy="0"/>
+          <a:chOff x="0" y="0"/>
+          <a:chExt cx="0" cy="0"/>
+        </a:xfrm>
+      </p:grpSpPr>
+      <p:sp>
+        <p:nvSpPr>
+          <p:cNvPr id="2" name="Title 1">
+            <a:extLst>
+              <a:ext uri="{FF2B5EF4-FFF2-40B4-BE49-F238E27FC236}">
+                <a16:creationId xmlns:a16="http://schemas.microsoft.com/office/drawing/2014/main" id="{78EE93E2-F570-B08D-5DEE-3395A3715372}"/>
+              </a:ext>
+            </a:extLst>
+          </p:cNvPr>
+          <p:cNvSpPr>
+            <a:spLocks noGrp="1"/>
+          </p:cNvSpPr>
+          <p:nvPr>
+            <p:ph type="title"/>
+          </p:nvPr>
+        </p:nvSpPr>
+        <p:spPr/>
+        <p:txBody>
+          <a:bodyPr/>
+          <a:lstStyle/>
+          <a:p>
+            <a:r>
+              <a:rPr lang="en-US" dirty="0"/>
+              <a:t>More details about the </a:t>
+            </a:r>
+            <a:r>
+              <a:rPr lang="en-US" dirty="0" err="1"/>
+              <a:t>Dockerfile</a:t>
+            </a:r>
+            <a:endParaRPr lang="en-US" dirty="0"/>
+          </a:p>
+        </p:txBody>
+      </p:sp>
+      <p:sp>
+        <p:nvSpPr>
+          <p:cNvPr id="3" name="Content Placeholder 2">
+            <a:extLst>
+              <a:ext uri="{FF2B5EF4-FFF2-40B4-BE49-F238E27FC236}">
+                <a16:creationId xmlns:a16="http://schemas.microsoft.com/office/drawing/2014/main" id="{C27CE259-C285-F5E9-8844-A383B2563925}"/>
+              </a:ext>
+            </a:extLst>
+          </p:cNvPr>
+          <p:cNvSpPr>
+            <a:spLocks noGrp="1"/>
+          </p:cNvSpPr>
+          <p:nvPr>
+            <p:ph idx="1"/>
+          </p:nvPr>
+        </p:nvSpPr>
+        <p:spPr/>
+        <p:txBody>
+          <a:bodyPr/>
+          <a:lstStyle/>
+          <a:p>
+            <a:r>
+              <a:rPr lang="en-US" dirty="0"/>
+              <a:t>ADD </a:t>
+            </a:r>
+            <a:r>
+              <a:rPr lang="en-US" dirty="0">
+                <a:hlinkClick r:id="rId2"/>
+              </a:rPr>
+              <a:t>https://github.com/GregePorter/RIS-quickstart.git</a:t>
+            </a:r>
+            <a:r>
+              <a:rPr lang="en-US" dirty="0"/>
+              <a:t> .</a:t>
+            </a:r>
+          </a:p>
+          <a:p>
+            <a:r>
+              <a:rPr lang="en-US" dirty="0"/>
+              <a:t>This will clone the given repo and put it in the root of the container</a:t>
+            </a:r>
+          </a:p>
+        </p:txBody>
+      </p:sp>
+    </p:spTree>
+    <p:extLst>
+      <p:ext uri="{BB962C8B-B14F-4D97-AF65-F5344CB8AC3E}">
+        <p14:creationId xmlns:p14="http://schemas.microsoft.com/office/powerpoint/2010/main" val="3301002617"/>
+      </p:ext>
+    </p:extLst>
+  </p:cSld>
+  <p:clrMapOvr>
+    <a:masterClrMapping/>
+  </p:clrMapOvr>
+</p:sld>
+</file>
+
+<file path=ppt/slides/slide17.xml><?xml version="1.0" encoding="utf-8"?>
+<p:sld xmlns:a="http://schemas.openxmlformats.org/drawingml/2006/main" xmlns:r="http://schemas.openxmlformats.org/officeDocument/2006/relationships" xmlns:p="http://schemas.openxmlformats.org/presentationml/2006/main">
+  <p:cSld>
+    <p:spTree>
+      <p:nvGrpSpPr>
+        <p:cNvPr id="1" name=""/>
+        <p:cNvGrpSpPr/>
+        <p:nvPr/>
+      </p:nvGrpSpPr>
+      <p:grpSpPr>
+        <a:xfrm>
+          <a:off x="0" y="0"/>
+          <a:ext cx="0" cy="0"/>
+          <a:chOff x="0" y="0"/>
+          <a:chExt cx="0" cy="0"/>
+        </a:xfrm>
+      </p:grpSpPr>
+      <p:sp>
+        <p:nvSpPr>
+          <p:cNvPr id="2" name="Title 1">
+            <a:extLst>
+              <a:ext uri="{FF2B5EF4-FFF2-40B4-BE49-F238E27FC236}">
+                <a16:creationId xmlns:a16="http://schemas.microsoft.com/office/drawing/2014/main" id="{78EE93E2-F570-B08D-5DEE-3395A3715372}"/>
+              </a:ext>
+            </a:extLst>
+          </p:cNvPr>
+          <p:cNvSpPr>
+            <a:spLocks noGrp="1"/>
+          </p:cNvSpPr>
+          <p:nvPr>
+            <p:ph type="title"/>
+          </p:nvPr>
+        </p:nvSpPr>
+        <p:spPr/>
+        <p:txBody>
+          <a:bodyPr/>
+          <a:lstStyle/>
+          <a:p>
+            <a:r>
+              <a:rPr lang="en-US" dirty="0"/>
+              <a:t>More details about the </a:t>
+            </a:r>
+            <a:r>
+              <a:rPr lang="en-US" dirty="0" err="1"/>
+              <a:t>Dockerfile</a:t>
+            </a:r>
+            <a:endParaRPr lang="en-US" dirty="0"/>
+          </a:p>
+        </p:txBody>
+      </p:sp>
+      <p:sp>
+        <p:nvSpPr>
+          <p:cNvPr id="3" name="Content Placeholder 2">
+            <a:extLst>
+              <a:ext uri="{FF2B5EF4-FFF2-40B4-BE49-F238E27FC236}">
+                <a16:creationId xmlns:a16="http://schemas.microsoft.com/office/drawing/2014/main" id="{C27CE259-C285-F5E9-8844-A383B2563925}"/>
+              </a:ext>
+            </a:extLst>
+          </p:cNvPr>
+          <p:cNvSpPr>
+            <a:spLocks noGrp="1"/>
+          </p:cNvSpPr>
+          <p:nvPr>
+            <p:ph idx="1"/>
+          </p:nvPr>
+        </p:nvSpPr>
+        <p:spPr/>
+        <p:txBody>
+          <a:bodyPr/>
+          <a:lstStyle/>
+          <a:p>
+            <a:r>
+              <a:rPr lang="en-US" dirty="0"/>
+              <a:t>RUN ./</a:t>
+            </a:r>
+            <a:r>
+              <a:rPr lang="en-US" dirty="0" err="1"/>
+              <a:t>run_python.sh</a:t>
+            </a:r>
+            <a:endParaRPr lang="en-US" dirty="0"/>
+          </a:p>
+          <a:p>
+            <a:endParaRPr lang="en-US" dirty="0"/>
+          </a:p>
+          <a:p>
+            <a:r>
+              <a:rPr lang="en-US" dirty="0"/>
+              <a:t>This will run the above script (which is in the root of the container) </a:t>
+            </a:r>
+            <a:r>
+              <a:rPr lang="en-US" b="1" dirty="0"/>
+              <a:t>when the container is being built</a:t>
+            </a:r>
+            <a:endParaRPr lang="en-US" dirty="0"/>
+          </a:p>
+        </p:txBody>
+      </p:sp>
+    </p:spTree>
+    <p:extLst>
+      <p:ext uri="{BB962C8B-B14F-4D97-AF65-F5344CB8AC3E}">
+        <p14:creationId xmlns:p14="http://schemas.microsoft.com/office/powerpoint/2010/main" val="3606253169"/>
+      </p:ext>
+    </p:extLst>
+  </p:cSld>
+  <p:clrMapOvr>
+    <a:masterClrMapping/>
+  </p:clrMapOvr>
+</p:sld>
+</file>
+
+<file path=ppt/slides/slide18.xml><?xml version="1.0" encoding="utf-8"?>
+<p:sld xmlns:a="http://schemas.openxmlformats.org/drawingml/2006/main" xmlns:r="http://schemas.openxmlformats.org/officeDocument/2006/relationships" xmlns:p="http://schemas.openxmlformats.org/presentationml/2006/main">
+  <p:cSld>
+    <p:spTree>
+      <p:nvGrpSpPr>
+        <p:cNvPr id="1" name=""/>
+        <p:cNvGrpSpPr/>
+        <p:nvPr/>
+      </p:nvGrpSpPr>
+      <p:grpSpPr>
+        <a:xfrm>
+          <a:off x="0" y="0"/>
+          <a:ext cx="0" cy="0"/>
+          <a:chOff x="0" y="0"/>
+          <a:chExt cx="0" cy="0"/>
+        </a:xfrm>
+      </p:grpSpPr>
+      <p:sp>
+        <p:nvSpPr>
+          <p:cNvPr id="2" name="Title 1">
+            <a:extLst>
+              <a:ext uri="{FF2B5EF4-FFF2-40B4-BE49-F238E27FC236}">
                 <a16:creationId xmlns:a16="http://schemas.microsoft.com/office/drawing/2014/main" id="{0BA656BF-8100-F11D-1A69-A830A4576E47}"/>
               </a:ext>
             </a:extLst>
@@ -5537,7 +5886,7 @@
 </p:sld>
 </file>
 
-<file path=ppt/slides/slide16.xml><?xml version="1.0" encoding="utf-8"?>
+<file path=ppt/slides/slide19.xml><?xml version="1.0" encoding="utf-8"?>
 <p:sld xmlns:a="http://schemas.openxmlformats.org/drawingml/2006/main" xmlns:r="http://schemas.openxmlformats.org/officeDocument/2006/relationships" xmlns:p="http://schemas.openxmlformats.org/presentationml/2006/main">
   <p:cSld>
     <p:spTree>

</xml_diff>

<commit_message>
Added a slide about running the different examples of added code
</commit_message>
<xml_diff>
--- a/slides/triads-ris-workshop-day-3.pptx
+++ b/slides/triads-ris-workshop-day-3.pptx
@@ -5,7 +5,7 @@
     <p:sldMasterId id="2147483648" r:id="rId1"/>
   </p:sldMasterIdLst>
   <p:notesMasterIdLst>
-    <p:notesMasterId r:id="rId21"/>
+    <p:notesMasterId r:id="rId22"/>
   </p:notesMasterIdLst>
   <p:sldIdLst>
     <p:sldId id="256" r:id="rId2"/>
@@ -25,8 +25,9 @@
     <p:sldId id="326" r:id="rId16"/>
     <p:sldId id="325" r:id="rId17"/>
     <p:sldId id="327" r:id="rId18"/>
-    <p:sldId id="297" r:id="rId19"/>
-    <p:sldId id="294" r:id="rId20"/>
+    <p:sldId id="328" r:id="rId19"/>
+    <p:sldId id="297" r:id="rId20"/>
+    <p:sldId id="294" r:id="rId21"/>
   </p:sldIdLst>
   <p:sldSz cx="12192000" cy="6858000"/>
   <p:notesSz cx="6858000" cy="9144000"/>
@@ -631,7 +632,7 @@
           <a:p>
             <a:fld id="{C2FD1589-7E77-6440-8706-C35CABE01F1C}" type="slidenum">
               <a:rPr lang="en-US" smtClean="0"/>
-              <a:t>19</a:t>
+              <a:t>20</a:t>
             </a:fld>
             <a:endParaRPr lang="en-US"/>
           </a:p>
@@ -5250,57 +5251,21 @@
           <a:p>
             <a:r>
               <a:rPr lang="en-US" dirty="0"/>
-              <a:t>You should see your new container image online</a:t>
-            </a:r>
-          </a:p>
-          <a:p>
-            <a:endParaRPr lang="en-US" dirty="0"/>
-          </a:p>
-          <a:p>
-            <a:r>
-              <a:rPr lang="en-US" dirty="0"/>
-              <a:t>Exercise – Run the basic-</a:t>
+              <a:t>You should see your new container in your repositories (and we’ll see what it looks like with different tags)</a:t>
+            </a:r>
+          </a:p>
+          <a:p>
+            <a:r>
+              <a:rPr lang="en-US" dirty="0"/>
+              <a:t>Clicking on a specific tag will allow you to look at the </a:t>
             </a:r>
             <a:r>
               <a:rPr lang="en-US" dirty="0" err="1"/>
-              <a:t>python.py</a:t>
-            </a:r>
-            <a:r>
-              <a:rPr lang="en-US" dirty="0"/>
-              <a:t> example with your new image</a:t>
-            </a:r>
-          </a:p>
-          <a:p>
-            <a:pPr marL="0" indent="0">
-              <a:buNone/>
-            </a:pPr>
-            <a:r>
-              <a:rPr lang="en-US" dirty="0"/>
-              <a:t>(</a:t>
-            </a:r>
-            <a:r>
-              <a:rPr lang="en-US" dirty="0" err="1"/>
-              <a:t>gregeporter</a:t>
-            </a:r>
-            <a:r>
-              <a:rPr lang="en-US" dirty="0"/>
-              <a:t>/</a:t>
-            </a:r>
-            <a:r>
-              <a:rPr lang="en-US" dirty="0" err="1"/>
-              <a:t>basic-python:latest</a:t>
-            </a:r>
-            <a:r>
-              <a:rPr lang="en-US" dirty="0"/>
-              <a:t>) is what I point to in my </a:t>
-            </a:r>
-            <a:r>
-              <a:rPr lang="en-US" dirty="0" err="1"/>
-              <a:t>bsub</a:t>
-            </a:r>
-            <a:r>
-              <a:rPr lang="en-US" dirty="0"/>
-              <a:t> command.</a:t>
+              <a:t>Dockerfile</a:t>
+            </a:r>
+            <a:r>
+              <a:rPr lang="en-US" dirty="0"/>
+              <a:t> itself that made that tag</a:t>
             </a:r>
           </a:p>
         </p:txBody>
@@ -5805,7 +5770,7 @@
           <p:cNvPr id="2" name="Title 1">
             <a:extLst>
               <a:ext uri="{FF2B5EF4-FFF2-40B4-BE49-F238E27FC236}">
-                <a16:creationId xmlns:a16="http://schemas.microsoft.com/office/drawing/2014/main" id="{0BA656BF-8100-F11D-1A69-A830A4576E47}"/>
+                <a16:creationId xmlns:a16="http://schemas.microsoft.com/office/drawing/2014/main" id="{78EE93E2-F570-B08D-5DEE-3395A3715372}"/>
               </a:ext>
             </a:extLst>
           </p:cNvPr>
@@ -5823,8 +5788,13 @@
           <a:p>
             <a:r>
               <a:rPr lang="en-US" dirty="0"/>
-              <a:t>In sum</a:t>
-            </a:r>
+              <a:t>With </a:t>
+            </a:r>
+            <a:r>
+              <a:rPr lang="en-US" dirty="0" err="1"/>
+              <a:t>workshop-python:with-ris</a:t>
+            </a:r>
+            <a:endParaRPr lang="en-US" dirty="0"/>
           </a:p>
         </p:txBody>
       </p:sp>
@@ -5833,7 +5803,7 @@
           <p:cNvPr id="3" name="Content Placeholder 2">
             <a:extLst>
               <a:ext uri="{FF2B5EF4-FFF2-40B4-BE49-F238E27FC236}">
-                <a16:creationId xmlns:a16="http://schemas.microsoft.com/office/drawing/2014/main" id="{E05A76E3-E6AA-1AB1-A415-5AB03C7D59BC}"/>
+                <a16:creationId xmlns:a16="http://schemas.microsoft.com/office/drawing/2014/main" id="{C27CE259-C285-F5E9-8844-A383B2563925}"/>
               </a:ext>
             </a:extLst>
           </p:cNvPr>
@@ -5846,37 +5816,203 @@
         </p:nvSpPr>
         <p:spPr/>
         <p:txBody>
-          <a:bodyPr/>
-          <a:lstStyle/>
-          <a:p>
-            <a:r>
-              <a:rPr lang="en-US" dirty="0"/>
-              <a:t>Why Docker</a:t>
-            </a:r>
-          </a:p>
-          <a:p>
-            <a:r>
-              <a:rPr lang="en-US" dirty="0"/>
-              <a:t>What is a </a:t>
-            </a:r>
+          <a:bodyPr>
+            <a:normAutofit fontScale="92500"/>
+          </a:bodyPr>
+          <a:lstStyle/>
+          <a:p>
             <a:r>
               <a:rPr lang="en-US" dirty="0" err="1"/>
-              <a:t>Dockerfile</a:t>
+              <a:t>bsub</a:t>
+            </a:r>
+            <a:r>
+              <a:rPr lang="en-US" dirty="0"/>
+              <a:t> -Is -G compute-</a:t>
+            </a:r>
+            <a:r>
+              <a:rPr lang="en-US" dirty="0" err="1"/>
+              <a:t>artsci</a:t>
+            </a:r>
+            <a:r>
+              <a:rPr lang="en-US" dirty="0"/>
+              <a:t> -q </a:t>
+            </a:r>
+            <a:r>
+              <a:rPr lang="en-US" dirty="0" err="1"/>
+              <a:t>artsci</a:t>
+            </a:r>
+            <a:r>
+              <a:rPr lang="en-US" dirty="0"/>
+              <a:t>-interactive -a "docker(</a:t>
+            </a:r>
+            <a:r>
+              <a:rPr lang="en-US" dirty="0" err="1"/>
+              <a:t>gregeporter</a:t>
+            </a:r>
+            <a:r>
+              <a:rPr lang="en-US" dirty="0"/>
+              <a:t>/</a:t>
+            </a:r>
+            <a:r>
+              <a:rPr lang="en-US" dirty="0" err="1"/>
+              <a:t>workshop-python:with-git</a:t>
+            </a:r>
+            <a:r>
+              <a:rPr lang="en-US" dirty="0"/>
+              <a:t>)" python /</a:t>
+            </a:r>
+            <a:r>
+              <a:rPr lang="en-US" dirty="0" err="1"/>
+              <a:t>copied_code</a:t>
+            </a:r>
+            <a:r>
+              <a:rPr lang="en-US" dirty="0"/>
+              <a:t>/basic-</a:t>
+            </a:r>
+            <a:r>
+              <a:rPr lang="en-US" dirty="0" err="1"/>
+              <a:t>python.py</a:t>
             </a:r>
             <a:endParaRPr lang="en-US" dirty="0"/>
           </a:p>
           <a:p>
-            <a:r>
-              <a:rPr lang="en-US" dirty="0"/>
-              <a:t>How to build on the RIS</a:t>
-            </a:r>
+            <a:pPr lvl="1"/>
+            <a:r>
+              <a:rPr lang="en-US" dirty="0"/>
+              <a:t>Added via COPY</a:t>
+            </a:r>
+          </a:p>
+          <a:p>
+            <a:r>
+              <a:rPr lang="en-US" dirty="0" err="1"/>
+              <a:t>bsub</a:t>
+            </a:r>
+            <a:r>
+              <a:rPr lang="en-US" dirty="0"/>
+              <a:t> -Is -G compute-</a:t>
+            </a:r>
+            <a:r>
+              <a:rPr lang="en-US" dirty="0" err="1"/>
+              <a:t>artsci</a:t>
+            </a:r>
+            <a:r>
+              <a:rPr lang="en-US" dirty="0"/>
+              <a:t> -q </a:t>
+            </a:r>
+            <a:r>
+              <a:rPr lang="en-US" dirty="0" err="1"/>
+              <a:t>artsci</a:t>
+            </a:r>
+            <a:r>
+              <a:rPr lang="en-US" dirty="0"/>
+              <a:t>-interactive -a "docker(</a:t>
+            </a:r>
+            <a:r>
+              <a:rPr lang="en-US" dirty="0" err="1"/>
+              <a:t>gregeporter</a:t>
+            </a:r>
+            <a:r>
+              <a:rPr lang="en-US" dirty="0"/>
+              <a:t>/</a:t>
+            </a:r>
+            <a:r>
+              <a:rPr lang="en-US" dirty="0" err="1"/>
+              <a:t>workshop-python:with-git</a:t>
+            </a:r>
+            <a:r>
+              <a:rPr lang="en-US" dirty="0"/>
+              <a:t>)" python /basic-examples/basic-</a:t>
+            </a:r>
+            <a:r>
+              <a:rPr lang="en-US" dirty="0" err="1"/>
+              <a:t>python.py</a:t>
+            </a:r>
+            <a:endParaRPr lang="en-US" dirty="0"/>
+          </a:p>
+          <a:p>
+            <a:pPr lvl="1"/>
+            <a:r>
+              <a:rPr lang="en-US" dirty="0"/>
+              <a:t>Pulled from GIT</a:t>
+            </a:r>
+          </a:p>
+          <a:p>
+            <a:r>
+              <a:rPr lang="en-US" dirty="0"/>
+              <a:t> </a:t>
+            </a:r>
+            <a:r>
+              <a:rPr lang="en-US" dirty="0" err="1"/>
+              <a:t>bsub</a:t>
+            </a:r>
+            <a:r>
+              <a:rPr lang="en-US" dirty="0"/>
+              <a:t> -Is -G compute-</a:t>
+            </a:r>
+            <a:r>
+              <a:rPr lang="en-US" dirty="0" err="1"/>
+              <a:t>artsci</a:t>
+            </a:r>
+            <a:r>
+              <a:rPr lang="en-US" dirty="0"/>
+              <a:t> -q </a:t>
+            </a:r>
+            <a:r>
+              <a:rPr lang="en-US" dirty="0" err="1"/>
+              <a:t>artsci</a:t>
+            </a:r>
+            <a:r>
+              <a:rPr lang="en-US" dirty="0"/>
+              <a:t>-interactive -a "docker(</a:t>
+            </a:r>
+            <a:r>
+              <a:rPr lang="en-US" dirty="0" err="1"/>
+              <a:t>gregeporter</a:t>
+            </a:r>
+            <a:r>
+              <a:rPr lang="en-US" dirty="0"/>
+              <a:t>/</a:t>
+            </a:r>
+            <a:r>
+              <a:rPr lang="en-US" dirty="0" err="1"/>
+              <a:t>workshop-python:with-git</a:t>
+            </a:r>
+            <a:r>
+              <a:rPr lang="en-US" dirty="0"/>
+              <a:t>)" python basic-</a:t>
+            </a:r>
+            <a:r>
+              <a:rPr lang="en-US" dirty="0" err="1"/>
+              <a:t>python.py</a:t>
+            </a:r>
+            <a:endParaRPr lang="en-US" dirty="0"/>
+          </a:p>
+          <a:p>
+            <a:pPr lvl="1"/>
+            <a:r>
+              <a:rPr lang="en-US" dirty="0"/>
+              <a:t>In the directory where the job </a:t>
+            </a:r>
+            <a:r>
+              <a:rPr lang="en-US" dirty="0" err="1"/>
+              <a:t>bsub</a:t>
+            </a:r>
+            <a:r>
+              <a:rPr lang="en-US" dirty="0"/>
+              <a:t> command </a:t>
+            </a:r>
+            <a:r>
+              <a:rPr lang="en-US"/>
+              <a:t>was initiated</a:t>
+            </a:r>
+            <a:endParaRPr lang="en-US" dirty="0"/>
           </a:p>
         </p:txBody>
       </p:sp>
     </p:spTree>
     <p:extLst>
       <p:ext uri="{BB962C8B-B14F-4D97-AF65-F5344CB8AC3E}">
-        <p14:creationId xmlns:p14="http://schemas.microsoft.com/office/powerpoint/2010/main" val="135299463"/>
+        <p14:creationId xmlns:p14="http://schemas.microsoft.com/office/powerpoint/2010/main" val="3421690224"/>
       </p:ext>
     </p:extLst>
   </p:cSld>
@@ -5908,7 +6044,7 @@
           <p:cNvPr id="2" name="Title 1">
             <a:extLst>
               <a:ext uri="{FF2B5EF4-FFF2-40B4-BE49-F238E27FC236}">
-                <a16:creationId xmlns:a16="http://schemas.microsoft.com/office/drawing/2014/main" id="{DCA50767-38E3-3C2F-C818-697B499F84E9}"/>
+                <a16:creationId xmlns:a16="http://schemas.microsoft.com/office/drawing/2014/main" id="{0BA656BF-8100-F11D-1A69-A830A4576E47}"/>
               </a:ext>
             </a:extLst>
           </p:cNvPr>
@@ -5926,7 +6062,7 @@
           <a:p>
             <a:r>
               <a:rPr lang="en-US" dirty="0"/>
-              <a:t>Thank you very much!</a:t>
+              <a:t>In sum</a:t>
             </a:r>
           </a:p>
         </p:txBody>
@@ -5936,7 +6072,7 @@
           <p:cNvPr id="3" name="Content Placeholder 2">
             <a:extLst>
               <a:ext uri="{FF2B5EF4-FFF2-40B4-BE49-F238E27FC236}">
-                <a16:creationId xmlns:a16="http://schemas.microsoft.com/office/drawing/2014/main" id="{FAC661AC-D36F-5DBC-787A-FE74D373D208}"/>
+                <a16:creationId xmlns:a16="http://schemas.microsoft.com/office/drawing/2014/main" id="{E05A76E3-E6AA-1AB1-A415-5AB03C7D59BC}"/>
               </a:ext>
             </a:extLst>
           </p:cNvPr>
@@ -5954,42 +6090,32 @@
           <a:p>
             <a:r>
               <a:rPr lang="en-US" dirty="0"/>
-              <a:t>Contact info:</a:t>
-            </a:r>
-          </a:p>
-          <a:p>
-            <a:pPr marL="457200" lvl="1" indent="0">
-              <a:buNone/>
-            </a:pPr>
-            <a:r>
-              <a:rPr lang="en-US" dirty="0"/>
-              <a:t>Gregory Porter</a:t>
-            </a:r>
-          </a:p>
-          <a:p>
-            <a:pPr marL="457200" lvl="1" indent="0">
-              <a:buNone/>
-            </a:pPr>
-            <a:r>
-              <a:rPr lang="en-US" dirty="0">
-                <a:hlinkClick r:id="rId3"/>
-              </a:rPr>
-              <a:t>G.porter@wustl.edu</a:t>
+              <a:t>Why Docker</a:t>
+            </a:r>
+          </a:p>
+          <a:p>
+            <a:r>
+              <a:rPr lang="en-US" dirty="0"/>
+              <a:t>What is a </a:t>
+            </a:r>
+            <a:r>
+              <a:rPr lang="en-US" dirty="0" err="1"/>
+              <a:t>Dockerfile</a:t>
             </a:r>
             <a:endParaRPr lang="en-US" dirty="0"/>
           </a:p>
           <a:p>
-            <a:pPr marL="457200" lvl="1" indent="0">
-              <a:buNone/>
-            </a:pPr>
-            <a:endParaRPr lang="en-US" dirty="0"/>
+            <a:r>
+              <a:rPr lang="en-US" dirty="0"/>
+              <a:t>How to build on the RIS</a:t>
+            </a:r>
           </a:p>
         </p:txBody>
       </p:sp>
     </p:spTree>
     <p:extLst>
       <p:ext uri="{BB962C8B-B14F-4D97-AF65-F5344CB8AC3E}">
-        <p14:creationId xmlns:p14="http://schemas.microsoft.com/office/powerpoint/2010/main" val="4083102771"/>
+        <p14:creationId xmlns:p14="http://schemas.microsoft.com/office/powerpoint/2010/main" val="135299463"/>
       </p:ext>
     </p:extLst>
   </p:cSld>
@@ -6102,6 +6228,119 @@
     <p:extLst>
       <p:ext uri="{BB962C8B-B14F-4D97-AF65-F5344CB8AC3E}">
         <p14:creationId xmlns:p14="http://schemas.microsoft.com/office/powerpoint/2010/main" val="2470395248"/>
+      </p:ext>
+    </p:extLst>
+  </p:cSld>
+  <p:clrMapOvr>
+    <a:masterClrMapping/>
+  </p:clrMapOvr>
+</p:sld>
+</file>
+
+<file path=ppt/slides/slide20.xml><?xml version="1.0" encoding="utf-8"?>
+<p:sld xmlns:a="http://schemas.openxmlformats.org/drawingml/2006/main" xmlns:r="http://schemas.openxmlformats.org/officeDocument/2006/relationships" xmlns:p="http://schemas.openxmlformats.org/presentationml/2006/main">
+  <p:cSld>
+    <p:spTree>
+      <p:nvGrpSpPr>
+        <p:cNvPr id="1" name=""/>
+        <p:cNvGrpSpPr/>
+        <p:nvPr/>
+      </p:nvGrpSpPr>
+      <p:grpSpPr>
+        <a:xfrm>
+          <a:off x="0" y="0"/>
+          <a:ext cx="0" cy="0"/>
+          <a:chOff x="0" y="0"/>
+          <a:chExt cx="0" cy="0"/>
+        </a:xfrm>
+      </p:grpSpPr>
+      <p:sp>
+        <p:nvSpPr>
+          <p:cNvPr id="2" name="Title 1">
+            <a:extLst>
+              <a:ext uri="{FF2B5EF4-FFF2-40B4-BE49-F238E27FC236}">
+                <a16:creationId xmlns:a16="http://schemas.microsoft.com/office/drawing/2014/main" id="{DCA50767-38E3-3C2F-C818-697B499F84E9}"/>
+              </a:ext>
+            </a:extLst>
+          </p:cNvPr>
+          <p:cNvSpPr>
+            <a:spLocks noGrp="1"/>
+          </p:cNvSpPr>
+          <p:nvPr>
+            <p:ph type="title"/>
+          </p:nvPr>
+        </p:nvSpPr>
+        <p:spPr/>
+        <p:txBody>
+          <a:bodyPr/>
+          <a:lstStyle/>
+          <a:p>
+            <a:r>
+              <a:rPr lang="en-US" dirty="0"/>
+              <a:t>Thank you very much!</a:t>
+            </a:r>
+          </a:p>
+        </p:txBody>
+      </p:sp>
+      <p:sp>
+        <p:nvSpPr>
+          <p:cNvPr id="3" name="Content Placeholder 2">
+            <a:extLst>
+              <a:ext uri="{FF2B5EF4-FFF2-40B4-BE49-F238E27FC236}">
+                <a16:creationId xmlns:a16="http://schemas.microsoft.com/office/drawing/2014/main" id="{FAC661AC-D36F-5DBC-787A-FE74D373D208}"/>
+              </a:ext>
+            </a:extLst>
+          </p:cNvPr>
+          <p:cNvSpPr>
+            <a:spLocks noGrp="1"/>
+          </p:cNvSpPr>
+          <p:nvPr>
+            <p:ph idx="1"/>
+          </p:nvPr>
+        </p:nvSpPr>
+        <p:spPr/>
+        <p:txBody>
+          <a:bodyPr/>
+          <a:lstStyle/>
+          <a:p>
+            <a:r>
+              <a:rPr lang="en-US" dirty="0"/>
+              <a:t>Contact info:</a:t>
+            </a:r>
+          </a:p>
+          <a:p>
+            <a:pPr marL="457200" lvl="1" indent="0">
+              <a:buNone/>
+            </a:pPr>
+            <a:r>
+              <a:rPr lang="en-US" dirty="0"/>
+              <a:t>Gregory Porter</a:t>
+            </a:r>
+          </a:p>
+          <a:p>
+            <a:pPr marL="457200" lvl="1" indent="0">
+              <a:buNone/>
+            </a:pPr>
+            <a:r>
+              <a:rPr lang="en-US" dirty="0">
+                <a:hlinkClick r:id="rId3"/>
+              </a:rPr>
+              <a:t>G.porter@wustl.edu</a:t>
+            </a:r>
+            <a:endParaRPr lang="en-US" dirty="0"/>
+          </a:p>
+          <a:p>
+            <a:pPr marL="457200" lvl="1" indent="0">
+              <a:buNone/>
+            </a:pPr>
+            <a:endParaRPr lang="en-US" dirty="0"/>
+          </a:p>
+        </p:txBody>
+      </p:sp>
+    </p:spTree>
+    <p:extLst>
+      <p:ext uri="{BB962C8B-B14F-4D97-AF65-F5344CB8AC3E}">
+        <p14:creationId xmlns:p14="http://schemas.microsoft.com/office/powerpoint/2010/main" val="4083102771"/>
       </p:ext>
     </p:extLst>
   </p:cSld>

</xml_diff>